<commit_message>
Update Doc Creation and Enhancement.pptx
Presentation on document redesign and new content creation.
</commit_message>
<xml_diff>
--- a/Doc Creation and Enhancement.pptx
+++ b/Doc Creation and Enhancement.pptx
@@ -136,7 +136,7 @@
 <file path=ppt/revisionInfo.xml><?xml version="1.0" encoding="utf-8"?>
 <p1510:revInfo xmlns:a="http://schemas.openxmlformats.org/drawingml/2006/main" xmlns:r="http://schemas.openxmlformats.org/officeDocument/2006/relationships" xmlns:p1510="http://schemas.microsoft.com/office/powerpoint/2015/10/main">
   <p1510:revLst>
-    <p1510:client id="{12583CBE-9CCD-48A9-9186-39DB3A796354}" v="12" dt="2024-02-08T06:47:00.135"/>
+    <p1510:client id="{12583CBE-9CCD-48A9-9186-39DB3A796354}" v="122" dt="2024-02-08T06:53:24.763"/>
     <p1510:client id="{7ABF1419-CD27-4A5C-8858-89463FC83654}" v="9" dt="2024-02-08T05:40:46.040"/>
   </p1510:revLst>
 </p1510:revInfo>
@@ -348,10 +348,33 @@
   <pc:docChgLst>
     <pc:chgData name="Jessica Ricks" userId="0490f4fba56e256d" providerId="LiveId" clId="{12583CBE-9CCD-48A9-9186-39DB3A796354}"/>
     <pc:docChg chg="undo custSel modSld">
-      <pc:chgData name="Jessica Ricks" userId="0490f4fba56e256d" providerId="LiveId" clId="{12583CBE-9CCD-48A9-9186-39DB3A796354}" dt="2024-02-08T06:47:00.135" v="214"/>
+      <pc:chgData name="Jessica Ricks" userId="0490f4fba56e256d" providerId="LiveId" clId="{12583CBE-9CCD-48A9-9186-39DB3A796354}" dt="2024-02-08T06:56:55.552" v="546" actId="13244"/>
       <pc:docMkLst>
         <pc:docMk/>
       </pc:docMkLst>
+      <pc:sldChg chg="modSp mod">
+        <pc:chgData name="Jessica Ricks" userId="0490f4fba56e256d" providerId="LiveId" clId="{12583CBE-9CCD-48A9-9186-39DB3A796354}" dt="2024-02-08T06:52:47.758" v="234" actId="962"/>
+        <pc:sldMkLst>
+          <pc:docMk/>
+          <pc:sldMk cId="4098551929" sldId="257"/>
+        </pc:sldMkLst>
+        <pc:spChg chg="mod">
+          <ac:chgData name="Jessica Ricks" userId="0490f4fba56e256d" providerId="LiveId" clId="{12583CBE-9CCD-48A9-9186-39DB3A796354}" dt="2024-02-08T06:52:46.144" v="233" actId="962"/>
+          <ac:spMkLst>
+            <pc:docMk/>
+            <pc:sldMk cId="4098551929" sldId="257"/>
+            <ac:spMk id="8" creationId="{DB8B70FF-B4B3-4CDD-95FB-7F28335D326E}"/>
+          </ac:spMkLst>
+        </pc:spChg>
+        <pc:spChg chg="mod">
+          <ac:chgData name="Jessica Ricks" userId="0490f4fba56e256d" providerId="LiveId" clId="{12583CBE-9CCD-48A9-9186-39DB3A796354}" dt="2024-02-08T06:52:47.758" v="234" actId="962"/>
+          <ac:spMkLst>
+            <pc:docMk/>
+            <pc:sldMk cId="4098551929" sldId="257"/>
+            <ac:spMk id="22" creationId="{35CAA934-910E-43C9-AFED-9A6624082EBF}"/>
+          </ac:spMkLst>
+        </pc:spChg>
+      </pc:sldChg>
       <pc:sldChg chg="modSp mod">
         <pc:chgData name="Jessica Ricks" userId="0490f4fba56e256d" providerId="LiveId" clId="{12583CBE-9CCD-48A9-9186-39DB3A796354}" dt="2024-02-08T06:39:49.698" v="189" actId="20577"/>
         <pc:sldMkLst>
@@ -366,6 +389,145 @@
             <ac:spMk id="5" creationId="{0671EC58-1B6F-123B-8E7D-4D445187270E}"/>
           </ac:spMkLst>
         </pc:spChg>
+      </pc:sldChg>
+      <pc:sldChg chg="modSp mod">
+        <pc:chgData name="Jessica Ricks" userId="0490f4fba56e256d" providerId="LiveId" clId="{12583CBE-9CCD-48A9-9186-39DB3A796354}" dt="2024-02-08T06:52:54.512" v="237" actId="962"/>
+        <pc:sldMkLst>
+          <pc:docMk/>
+          <pc:sldMk cId="1975412304" sldId="260"/>
+        </pc:sldMkLst>
+        <pc:spChg chg="mod">
+          <ac:chgData name="Jessica Ricks" userId="0490f4fba56e256d" providerId="LiveId" clId="{12583CBE-9CCD-48A9-9186-39DB3A796354}" dt="2024-02-08T06:52:51.116" v="235" actId="962"/>
+          <ac:spMkLst>
+            <pc:docMk/>
+            <pc:sldMk cId="1975412304" sldId="260"/>
+            <ac:spMk id="6" creationId="{6D905CB5-3799-4A84-BFCA-A92262623B37}"/>
+          </ac:spMkLst>
+        </pc:spChg>
+        <pc:spChg chg="mod">
+          <ac:chgData name="Jessica Ricks" userId="0490f4fba56e256d" providerId="LiveId" clId="{12583CBE-9CCD-48A9-9186-39DB3A796354}" dt="2024-02-08T06:52:52.857" v="236" actId="962"/>
+          <ac:spMkLst>
+            <pc:docMk/>
+            <pc:sldMk cId="1975412304" sldId="260"/>
+            <ac:spMk id="7" creationId="{4FF87671-2CD2-4EF9-9AC9-F8E914162808}"/>
+          </ac:spMkLst>
+        </pc:spChg>
+        <pc:spChg chg="mod">
+          <ac:chgData name="Jessica Ricks" userId="0490f4fba56e256d" providerId="LiveId" clId="{12583CBE-9CCD-48A9-9186-39DB3A796354}" dt="2024-02-08T06:52:54.512" v="237" actId="962"/>
+          <ac:spMkLst>
+            <pc:docMk/>
+            <pc:sldMk cId="1975412304" sldId="260"/>
+            <ac:spMk id="11" creationId="{2F4520BE-2380-47F5-9E12-6CAE4AB044CA}"/>
+          </ac:spMkLst>
+        </pc:spChg>
+      </pc:sldChg>
+      <pc:sldChg chg="modSp">
+        <pc:chgData name="Jessica Ricks" userId="0490f4fba56e256d" providerId="LiveId" clId="{12583CBE-9CCD-48A9-9186-39DB3A796354}" dt="2024-02-08T06:53:24.763" v="347" actId="962"/>
+        <pc:sldMkLst>
+          <pc:docMk/>
+          <pc:sldMk cId="1033809358" sldId="261"/>
+        </pc:sldMkLst>
+        <pc:graphicFrameChg chg="mod">
+          <ac:chgData name="Jessica Ricks" userId="0490f4fba56e256d" providerId="LiveId" clId="{12583CBE-9CCD-48A9-9186-39DB3A796354}" dt="2024-02-08T06:53:24.763" v="347" actId="962"/>
+          <ac:graphicFrameMkLst>
+            <pc:docMk/>
+            <pc:sldMk cId="1033809358" sldId="261"/>
+            <ac:graphicFrameMk id="4" creationId="{78BF3338-23B5-4776-9793-3C9C4B1C1439}"/>
+          </ac:graphicFrameMkLst>
+        </pc:graphicFrameChg>
+      </pc:sldChg>
+      <pc:sldChg chg="modSp mod">
+        <pc:chgData name="Jessica Ricks" userId="0490f4fba56e256d" providerId="LiveId" clId="{12583CBE-9CCD-48A9-9186-39DB3A796354}" dt="2024-02-08T06:53:37.827" v="353" actId="962"/>
+        <pc:sldMkLst>
+          <pc:docMk/>
+          <pc:sldMk cId="3443117565" sldId="263"/>
+        </pc:sldMkLst>
+        <pc:spChg chg="mod">
+          <ac:chgData name="Jessica Ricks" userId="0490f4fba56e256d" providerId="LiveId" clId="{12583CBE-9CCD-48A9-9186-39DB3A796354}" dt="2024-02-08T06:53:34.794" v="351" actId="962"/>
+          <ac:spMkLst>
+            <pc:docMk/>
+            <pc:sldMk cId="3443117565" sldId="263"/>
+            <ac:spMk id="8" creationId="{BF810C56-DF28-484B-B735-8D4A0FF113BF}"/>
+          </ac:spMkLst>
+        </pc:spChg>
+        <pc:spChg chg="mod">
+          <ac:chgData name="Jessica Ricks" userId="0490f4fba56e256d" providerId="LiveId" clId="{12583CBE-9CCD-48A9-9186-39DB3A796354}" dt="2024-02-08T06:53:36.323" v="352" actId="962"/>
+          <ac:spMkLst>
+            <pc:docMk/>
+            <pc:sldMk cId="3443117565" sldId="263"/>
+            <ac:spMk id="14" creationId="{94C77FD8-EBBF-450B-B7CD-C99ADFB6E993}"/>
+          </ac:spMkLst>
+        </pc:spChg>
+        <pc:spChg chg="mod">
+          <ac:chgData name="Jessica Ricks" userId="0490f4fba56e256d" providerId="LiveId" clId="{12583CBE-9CCD-48A9-9186-39DB3A796354}" dt="2024-02-08T06:53:37.827" v="353" actId="962"/>
+          <ac:spMkLst>
+            <pc:docMk/>
+            <pc:sldMk cId="3443117565" sldId="263"/>
+            <ac:spMk id="17" creationId="{2640CC38-83D2-46C1-B14A-BB0AB8E9DBF9}"/>
+          </ac:spMkLst>
+        </pc:spChg>
+      </pc:sldChg>
+      <pc:sldChg chg="modSp mod">
+        <pc:chgData name="Jessica Ricks" userId="0490f4fba56e256d" providerId="LiveId" clId="{12583CBE-9CCD-48A9-9186-39DB3A796354}" dt="2024-02-08T06:53:43.402" v="355" actId="962"/>
+        <pc:sldMkLst>
+          <pc:docMk/>
+          <pc:sldMk cId="2384536817" sldId="264"/>
+        </pc:sldMkLst>
+        <pc:spChg chg="mod">
+          <ac:chgData name="Jessica Ricks" userId="0490f4fba56e256d" providerId="LiveId" clId="{12583CBE-9CCD-48A9-9186-39DB3A796354}" dt="2024-02-08T06:53:41.017" v="354" actId="962"/>
+          <ac:spMkLst>
+            <pc:docMk/>
+            <pc:sldMk cId="2384536817" sldId="264"/>
+            <ac:spMk id="6" creationId="{AB2489B4-C02A-4B76-9D97-92815883B76C}"/>
+          </ac:spMkLst>
+        </pc:spChg>
+        <pc:spChg chg="mod">
+          <ac:chgData name="Jessica Ricks" userId="0490f4fba56e256d" providerId="LiveId" clId="{12583CBE-9CCD-48A9-9186-39DB3A796354}" dt="2024-02-08T06:53:43.402" v="355" actId="962"/>
+          <ac:spMkLst>
+            <pc:docMk/>
+            <pc:sldMk cId="2384536817" sldId="264"/>
+            <ac:spMk id="7" creationId="{2CFC08E3-97CE-4F1D-A241-772B68560239}"/>
+          </ac:spMkLst>
+        </pc:spChg>
+      </pc:sldChg>
+      <pc:sldChg chg="modSp mod">
+        <pc:chgData name="Jessica Ricks" userId="0490f4fba56e256d" providerId="LiveId" clId="{12583CBE-9CCD-48A9-9186-39DB3A796354}" dt="2024-02-08T06:55:37.959" v="538" actId="13244"/>
+        <pc:sldMkLst>
+          <pc:docMk/>
+          <pc:sldMk cId="3179734217" sldId="265"/>
+        </pc:sldMkLst>
+        <pc:grpChg chg="mod">
+          <ac:chgData name="Jessica Ricks" userId="0490f4fba56e256d" providerId="LiveId" clId="{12583CBE-9CCD-48A9-9186-39DB3A796354}" dt="2024-02-08T06:55:07.439" v="503" actId="962"/>
+          <ac:grpSpMkLst>
+            <pc:docMk/>
+            <pc:sldMk cId="3179734217" sldId="265"/>
+            <ac:grpSpMk id="5" creationId="{D82E720A-B116-419B-8479-49CA3C01B92B}"/>
+          </ac:grpSpMkLst>
+        </pc:grpChg>
+        <pc:grpChg chg="mod">
+          <ac:chgData name="Jessica Ricks" userId="0490f4fba56e256d" providerId="LiveId" clId="{12583CBE-9CCD-48A9-9186-39DB3A796354}" dt="2024-02-08T06:54:59.228" v="471" actId="962"/>
+          <ac:grpSpMkLst>
+            <pc:docMk/>
+            <pc:sldMk cId="3179734217" sldId="265"/>
+            <ac:grpSpMk id="6" creationId="{7A3C312B-CD57-4B7B-94FD-61AEE248A548}"/>
+          </ac:grpSpMkLst>
+        </pc:grpChg>
+        <pc:grpChg chg="mod">
+          <ac:chgData name="Jessica Ricks" userId="0490f4fba56e256d" providerId="LiveId" clId="{12583CBE-9CCD-48A9-9186-39DB3A796354}" dt="2024-02-08T06:54:49.060" v="435" actId="962"/>
+          <ac:grpSpMkLst>
+            <pc:docMk/>
+            <pc:sldMk cId="3179734217" sldId="265"/>
+            <ac:grpSpMk id="24" creationId="{DDC49D31-0E50-4D21-A5B9-6D1DF034E03B}"/>
+          </ac:grpSpMkLst>
+        </pc:grpChg>
+        <pc:grpChg chg="mod ord">
+          <ac:chgData name="Jessica Ricks" userId="0490f4fba56e256d" providerId="LiveId" clId="{12583CBE-9CCD-48A9-9186-39DB3A796354}" dt="2024-02-08T06:55:37.959" v="538" actId="13244"/>
+          <ac:grpSpMkLst>
+            <pc:docMk/>
+            <pc:sldMk cId="3179734217" sldId="265"/>
+            <ac:grpSpMk id="25" creationId="{85AE4A0C-4A60-4195-88B8-38E964E23610}"/>
+          </ac:grpSpMkLst>
+        </pc:grpChg>
       </pc:sldChg>
       <pc:sldChg chg="modSp mod setBg">
         <pc:chgData name="Jessica Ricks" userId="0490f4fba56e256d" providerId="LiveId" clId="{12583CBE-9CCD-48A9-9186-39DB3A796354}" dt="2024-02-08T06:47:00.135" v="214"/>
@@ -397,6 +559,53 @@
             <ac:picMk id="7" creationId="{A48BA313-987D-482D-8584-10CCE5ECC8F9}"/>
           </ac:picMkLst>
         </pc:picChg>
+      </pc:sldChg>
+      <pc:sldChg chg="modSp mod">
+        <pc:chgData name="Jessica Ricks" userId="0490f4fba56e256d" providerId="LiveId" clId="{12583CBE-9CCD-48A9-9186-39DB3A796354}" dt="2024-02-08T06:52:35.850" v="232" actId="962"/>
+        <pc:sldMkLst>
+          <pc:docMk/>
+          <pc:sldMk cId="564155159" sldId="270"/>
+        </pc:sldMkLst>
+        <pc:spChg chg="mod">
+          <ac:chgData name="Jessica Ricks" userId="0490f4fba56e256d" providerId="LiveId" clId="{12583CBE-9CCD-48A9-9186-39DB3A796354}" dt="2024-02-08T06:52:02.642" v="217" actId="962"/>
+          <ac:spMkLst>
+            <pc:docMk/>
+            <pc:sldMk cId="564155159" sldId="270"/>
+            <ac:spMk id="8" creationId="{DB8B70FF-B4B3-4CDD-95FB-7F28335D326E}"/>
+          </ac:spMkLst>
+        </pc:spChg>
+        <pc:spChg chg="mod">
+          <ac:chgData name="Jessica Ricks" userId="0490f4fba56e256d" providerId="LiveId" clId="{12583CBE-9CCD-48A9-9186-39DB3A796354}" dt="2024-02-08T06:52:04.986" v="218" actId="962"/>
+          <ac:spMkLst>
+            <pc:docMk/>
+            <pc:sldMk cId="564155159" sldId="270"/>
+            <ac:spMk id="22" creationId="{35CAA934-910E-43C9-AFED-9A6624082EBF}"/>
+          </ac:spMkLst>
+        </pc:spChg>
+        <pc:spChg chg="mod">
+          <ac:chgData name="Jessica Ricks" userId="0490f4fba56e256d" providerId="LiveId" clId="{12583CBE-9CCD-48A9-9186-39DB3A796354}" dt="2024-02-08T06:52:08.361" v="219" actId="962"/>
+          <ac:spMkLst>
+            <pc:docMk/>
+            <pc:sldMk cId="564155159" sldId="270"/>
+            <ac:spMk id="24" creationId="{D184595D-A985-460C-A3D0-9AE9CCB5B3AB}"/>
+          </ac:spMkLst>
+        </pc:spChg>
+        <pc:spChg chg="mod">
+          <ac:chgData name="Jessica Ricks" userId="0490f4fba56e256d" providerId="LiveId" clId="{12583CBE-9CCD-48A9-9186-39DB3A796354}" dt="2024-02-08T06:52:11.003" v="220" actId="962"/>
+          <ac:spMkLst>
+            <pc:docMk/>
+            <pc:sldMk cId="564155159" sldId="270"/>
+            <ac:spMk id="26" creationId="{943452F2-EAB8-4153-9025-72F2162E8571}"/>
+          </ac:spMkLst>
+        </pc:spChg>
+        <pc:spChg chg="mod">
+          <ac:chgData name="Jessica Ricks" userId="0490f4fba56e256d" providerId="LiveId" clId="{12583CBE-9CCD-48A9-9186-39DB3A796354}" dt="2024-02-08T06:52:35.850" v="232" actId="962"/>
+          <ac:spMkLst>
+            <pc:docMk/>
+            <pc:sldMk cId="564155159" sldId="270"/>
+            <ac:spMk id="31" creationId="{EE247266-C3CC-43ED-859B-D6C8089B4809}"/>
+          </ac:spMkLst>
+        </pc:spChg>
       </pc:sldChg>
       <pc:sldChg chg="delSp modSp mod setBg delDesignElem chgLayout">
         <pc:chgData name="Jessica Ricks" userId="0490f4fba56e256d" providerId="LiveId" clId="{12583CBE-9CCD-48A9-9186-39DB3A796354}" dt="2024-02-08T06:34:46.274" v="173" actId="207"/>
@@ -445,7 +654,38 @@
         </pc:sldMkLst>
       </pc:sldChg>
       <pc:sldChg chg="modSp mod">
-        <pc:chgData name="Jessica Ricks" userId="0490f4fba56e256d" providerId="LiveId" clId="{12583CBE-9CCD-48A9-9186-39DB3A796354}" dt="2024-02-08T06:45:57.747" v="211" actId="20577"/>
+        <pc:chgData name="Jessica Ricks" userId="0490f4fba56e256d" providerId="LiveId" clId="{12583CBE-9CCD-48A9-9186-39DB3A796354}" dt="2024-02-08T06:53:32.575" v="350" actId="962"/>
+        <pc:sldMkLst>
+          <pc:docMk/>
+          <pc:sldMk cId="959061867" sldId="274"/>
+        </pc:sldMkLst>
+        <pc:spChg chg="mod">
+          <ac:chgData name="Jessica Ricks" userId="0490f4fba56e256d" providerId="LiveId" clId="{12583CBE-9CCD-48A9-9186-39DB3A796354}" dt="2024-02-08T06:53:29.610" v="348" actId="962"/>
+          <ac:spMkLst>
+            <pc:docMk/>
+            <pc:sldMk cId="959061867" sldId="274"/>
+            <ac:spMk id="6" creationId="{6D905CB5-3799-4A84-BFCA-A92262623B37}"/>
+          </ac:spMkLst>
+        </pc:spChg>
+        <pc:spChg chg="mod">
+          <ac:chgData name="Jessica Ricks" userId="0490f4fba56e256d" providerId="LiveId" clId="{12583CBE-9CCD-48A9-9186-39DB3A796354}" dt="2024-02-08T06:53:31.193" v="349" actId="962"/>
+          <ac:spMkLst>
+            <pc:docMk/>
+            <pc:sldMk cId="959061867" sldId="274"/>
+            <ac:spMk id="7" creationId="{4FF87671-2CD2-4EF9-9AC9-F8E914162808}"/>
+          </ac:spMkLst>
+        </pc:spChg>
+        <pc:spChg chg="mod">
+          <ac:chgData name="Jessica Ricks" userId="0490f4fba56e256d" providerId="LiveId" clId="{12583CBE-9CCD-48A9-9186-39DB3A796354}" dt="2024-02-08T06:53:32.575" v="350" actId="962"/>
+          <ac:spMkLst>
+            <pc:docMk/>
+            <pc:sldMk cId="959061867" sldId="274"/>
+            <ac:spMk id="11" creationId="{2F4520BE-2380-47F5-9E12-6CAE4AB044CA}"/>
+          </ac:spMkLst>
+        </pc:spChg>
+      </pc:sldChg>
+      <pc:sldChg chg="modSp mod">
+        <pc:chgData name="Jessica Ricks" userId="0490f4fba56e256d" providerId="LiveId" clId="{12583CBE-9CCD-48A9-9186-39DB3A796354}" dt="2024-02-08T06:55:50.877" v="541" actId="962"/>
         <pc:sldMkLst>
           <pc:docMk/>
           <pc:sldMk cId="68593404" sldId="275"/>
@@ -467,11 +707,74 @@
           </ac:spMkLst>
         </pc:spChg>
         <pc:spChg chg="mod">
+          <ac:chgData name="Jessica Ricks" userId="0490f4fba56e256d" providerId="LiveId" clId="{12583CBE-9CCD-48A9-9186-39DB3A796354}" dt="2024-02-08T06:55:44.755" v="539" actId="962"/>
+          <ac:spMkLst>
+            <pc:docMk/>
+            <pc:sldMk cId="68593404" sldId="275"/>
+            <ac:spMk id="10" creationId="{4B11F372-BD8A-489E-84FC-FC5121571CEF}"/>
+          </ac:spMkLst>
+        </pc:spChg>
+        <pc:spChg chg="mod">
+          <ac:chgData name="Jessica Ricks" userId="0490f4fba56e256d" providerId="LiveId" clId="{12583CBE-9CCD-48A9-9186-39DB3A796354}" dt="2024-02-08T06:55:47.842" v="540" actId="962"/>
+          <ac:spMkLst>
+            <pc:docMk/>
+            <pc:sldMk cId="68593404" sldId="275"/>
+            <ac:spMk id="11" creationId="{4FAA73A2-9022-4A2A-9B31-DE26CEA5F2E7}"/>
+          </ac:spMkLst>
+        </pc:spChg>
+        <pc:spChg chg="mod">
           <ac:chgData name="Jessica Ricks" userId="0490f4fba56e256d" providerId="LiveId" clId="{12583CBE-9CCD-48A9-9186-39DB3A796354}" dt="2024-02-08T06:45:57.747" v="211" actId="20577"/>
           <ac:spMkLst>
             <pc:docMk/>
             <pc:sldMk cId="68593404" sldId="275"/>
             <ac:spMk id="12" creationId="{464AAC17-0F56-46EB-B776-0B73B5A71252}"/>
+          </ac:spMkLst>
+        </pc:spChg>
+        <pc:spChg chg="mod">
+          <ac:chgData name="Jessica Ricks" userId="0490f4fba56e256d" providerId="LiveId" clId="{12583CBE-9CCD-48A9-9186-39DB3A796354}" dt="2024-02-08T06:55:50.877" v="541" actId="962"/>
+          <ac:spMkLst>
+            <pc:docMk/>
+            <pc:sldMk cId="68593404" sldId="275"/>
+            <ac:spMk id="13" creationId="{9BD6EC56-10AA-4C55-AA60-A1884220286B}"/>
+          </ac:spMkLst>
+        </pc:spChg>
+      </pc:sldChg>
+      <pc:sldChg chg="modSp mod">
+        <pc:chgData name="Jessica Ricks" userId="0490f4fba56e256d" providerId="LiveId" clId="{12583CBE-9CCD-48A9-9186-39DB3A796354}" dt="2024-02-08T06:56:55.552" v="546" actId="13244"/>
+        <pc:sldMkLst>
+          <pc:docMk/>
+          <pc:sldMk cId="1962644860" sldId="276"/>
+        </pc:sldMkLst>
+        <pc:spChg chg="ord">
+          <ac:chgData name="Jessica Ricks" userId="0490f4fba56e256d" providerId="LiveId" clId="{12583CBE-9CCD-48A9-9186-39DB3A796354}" dt="2024-02-08T06:56:45.596" v="545" actId="13244"/>
+          <ac:spMkLst>
+            <pc:docMk/>
+            <pc:sldMk cId="1962644860" sldId="276"/>
+            <ac:spMk id="4" creationId="{482EE43D-46DA-4232-BE05-383CCE646DC4}"/>
+          </ac:spMkLst>
+        </pc:spChg>
+        <pc:spChg chg="mod">
+          <ac:chgData name="Jessica Ricks" userId="0490f4fba56e256d" providerId="LiveId" clId="{12583CBE-9CCD-48A9-9186-39DB3A796354}" dt="2024-02-08T06:55:54.777" v="542" actId="962"/>
+          <ac:spMkLst>
+            <pc:docMk/>
+            <pc:sldMk cId="1962644860" sldId="276"/>
+            <ac:spMk id="5" creationId="{1172D80E-74B6-4B3F-B56E-34450A45C8C6}"/>
+          </ac:spMkLst>
+        </pc:spChg>
+        <pc:spChg chg="ord">
+          <ac:chgData name="Jessica Ricks" userId="0490f4fba56e256d" providerId="LiveId" clId="{12583CBE-9CCD-48A9-9186-39DB3A796354}" dt="2024-02-08T06:56:55.552" v="546" actId="13244"/>
+          <ac:spMkLst>
+            <pc:docMk/>
+            <pc:sldMk cId="1962644860" sldId="276"/>
+            <ac:spMk id="7" creationId="{2FEDB523-DC7B-4CA3-91C1-19B5ECE014D7}"/>
+          </ac:spMkLst>
+        </pc:spChg>
+        <pc:spChg chg="mod">
+          <ac:chgData name="Jessica Ricks" userId="0490f4fba56e256d" providerId="LiveId" clId="{12583CBE-9CCD-48A9-9186-39DB3A796354}" dt="2024-02-08T06:55:57.090" v="543" actId="962"/>
+          <ac:spMkLst>
+            <pc:docMk/>
+            <pc:sldMk cId="1962644860" sldId="276"/>
+            <ac:spMk id="8" creationId="{587D0497-78A2-4ABB-A75D-2884D509A066}"/>
           </ac:spMkLst>
         </pc:spChg>
       </pc:sldChg>
@@ -490,7 +793,7 @@
         </pc:sldMkLst>
       </pc:sldChg>
       <pc:sldChg chg="addSp delSp modSp mod setBg">
-        <pc:chgData name="Jessica Ricks" userId="0490f4fba56e256d" providerId="LiveId" clId="{12583CBE-9CCD-48A9-9186-39DB3A796354}" dt="2024-02-08T06:38:08.465" v="188"/>
+        <pc:chgData name="Jessica Ricks" userId="0490f4fba56e256d" providerId="LiveId" clId="{12583CBE-9CCD-48A9-9186-39DB3A796354}" dt="2024-02-08T06:51:55.853" v="216" actId="962"/>
         <pc:sldMkLst>
           <pc:docMk/>
           <pc:sldMk cId="513399631" sldId="279"/>
@@ -512,7 +815,7 @@
           </ac:spMkLst>
         </pc:spChg>
         <pc:spChg chg="mod">
-          <ac:chgData name="Jessica Ricks" userId="0490f4fba56e256d" providerId="LiveId" clId="{12583CBE-9CCD-48A9-9186-39DB3A796354}" dt="2024-02-08T06:19:12.629" v="77" actId="207"/>
+          <ac:chgData name="Jessica Ricks" userId="0490f4fba56e256d" providerId="LiveId" clId="{12583CBE-9CCD-48A9-9186-39DB3A796354}" dt="2024-02-08T06:51:41.880" v="215" actId="1076"/>
           <ac:spMkLst>
             <pc:docMk/>
             <pc:sldMk cId="513399631" sldId="279"/>
@@ -536,7 +839,7 @@
           </ac:spMkLst>
         </pc:spChg>
         <pc:grpChg chg="add mod">
-          <ac:chgData name="Jessica Ricks" userId="0490f4fba56e256d" providerId="LiveId" clId="{12583CBE-9CCD-48A9-9186-39DB3A796354}" dt="2024-02-08T06:38:08.465" v="188"/>
+          <ac:chgData name="Jessica Ricks" userId="0490f4fba56e256d" providerId="LiveId" clId="{12583CBE-9CCD-48A9-9186-39DB3A796354}" dt="2024-02-08T06:51:55.853" v="216" actId="962"/>
           <ac:grpSpMkLst>
             <pc:docMk/>
             <pc:sldMk cId="513399631" sldId="279"/>
@@ -13306,7 +13609,7 @@
         </p:nvSpPr>
         <p:spPr>
           <a:xfrm>
-            <a:off x="7048500" y="5267325"/>
+            <a:off x="7251700" y="5599987"/>
             <a:ext cx="4876800" cy="1200329"/>
           </a:xfrm>
           <a:prstGeom prst="rect">
@@ -13384,6 +13687,9 @@
             <a:extLst>
               <a:ext uri="{FF2B5EF4-FFF2-40B4-BE49-F238E27FC236}">
                 <a16:creationId xmlns:a16="http://schemas.microsoft.com/office/drawing/2014/main" id="{49EFA276-84AD-A53B-BE29-7DA0C229CA39}"/>
+              </a:ext>
+              <a:ext uri="{C183D7F6-B498-43B3-948B-1728B52AA6E4}">
+                <adec:decorative xmlns:adec="http://schemas.microsoft.com/office/drawing/2017/decorative" val="1"/>
               </a:ext>
             </a:extLst>
           </p:cNvPr>
@@ -13937,7 +14243,7 @@
       </p:grpSpPr>
       <p:graphicFrame>
         <p:nvGraphicFramePr>
-          <p:cNvPr id="4" name="Diagram 3">
+          <p:cNvPr id="4" name="Diagram 3" descr="New content creation process: research, organize, write">
             <a:extLst>
               <a:ext uri="{FF2B5EF4-FFF2-40B4-BE49-F238E27FC236}">
                 <a16:creationId xmlns:a16="http://schemas.microsoft.com/office/drawing/2014/main" id="{78BF3338-23B5-4776-9793-3C9C4B1C1439}"/>
@@ -13948,7 +14254,7 @@
           <p:nvPr>
             <p:extLst>
               <p:ext uri="{D42A27DB-BD31-4B8C-83A1-F6EECF244321}">
-                <p14:modId xmlns:p14="http://schemas.microsoft.com/office/powerpoint/2010/main" val="797930571"/>
+                <p14:modId xmlns:p14="http://schemas.microsoft.com/office/powerpoint/2010/main" val="1505517095"/>
               </p:ext>
             </p:extLst>
           </p:nvPr>
@@ -14174,6 +14480,9 @@
               <a:ext uri="{FF2B5EF4-FFF2-40B4-BE49-F238E27FC236}">
                 <a16:creationId xmlns:a16="http://schemas.microsoft.com/office/drawing/2014/main" id="{6D905CB5-3799-4A84-BFCA-A92262623B37}"/>
               </a:ext>
+              <a:ext uri="{C183D7F6-B498-43B3-948B-1728B52AA6E4}">
+                <adec:decorative xmlns:adec="http://schemas.microsoft.com/office/drawing/2017/decorative" val="1"/>
+              </a:ext>
             </a:extLst>
           </p:cNvPr>
           <p:cNvSpPr/>
@@ -14237,6 +14546,9 @@
               <a:ext uri="{FF2B5EF4-FFF2-40B4-BE49-F238E27FC236}">
                 <a16:creationId xmlns:a16="http://schemas.microsoft.com/office/drawing/2014/main" id="{4FF87671-2CD2-4EF9-9AC9-F8E914162808}"/>
               </a:ext>
+              <a:ext uri="{C183D7F6-B498-43B3-948B-1728B52AA6E4}">
+                <adec:decorative xmlns:adec="http://schemas.microsoft.com/office/drawing/2017/decorative" val="1"/>
+              </a:ext>
             </a:extLst>
           </p:cNvPr>
           <p:cNvSpPr/>
@@ -14362,6 +14674,9 @@
             <a:extLst>
               <a:ext uri="{FF2B5EF4-FFF2-40B4-BE49-F238E27FC236}">
                 <a16:creationId xmlns:a16="http://schemas.microsoft.com/office/drawing/2014/main" id="{2F4520BE-2380-47F5-9E12-6CAE4AB044CA}"/>
+              </a:ext>
+              <a:ext uri="{C183D7F6-B498-43B3-948B-1728B52AA6E4}">
+                <adec:decorative xmlns:adec="http://schemas.microsoft.com/office/drawing/2017/decorative" val="1"/>
               </a:ext>
             </a:extLst>
           </p:cNvPr>
@@ -14886,6 +15201,9 @@
               <a:ext uri="{FF2B5EF4-FFF2-40B4-BE49-F238E27FC236}">
                 <a16:creationId xmlns:a16="http://schemas.microsoft.com/office/drawing/2014/main" id="{BF810C56-DF28-484B-B735-8D4A0FF113BF}"/>
               </a:ext>
+              <a:ext uri="{C183D7F6-B498-43B3-948B-1728B52AA6E4}">
+                <adec:decorative xmlns:adec="http://schemas.microsoft.com/office/drawing/2017/decorative" val="1"/>
+              </a:ext>
             </a:extLst>
           </p:cNvPr>
           <p:cNvSpPr/>
@@ -14949,6 +15267,9 @@
               <a:ext uri="{FF2B5EF4-FFF2-40B4-BE49-F238E27FC236}">
                 <a16:creationId xmlns:a16="http://schemas.microsoft.com/office/drawing/2014/main" id="{94C77FD8-EBBF-450B-B7CD-C99ADFB6E993}"/>
               </a:ext>
+              <a:ext uri="{C183D7F6-B498-43B3-948B-1728B52AA6E4}">
+                <adec:decorative xmlns:adec="http://schemas.microsoft.com/office/drawing/2017/decorative" val="1"/>
+              </a:ext>
             </a:extLst>
           </p:cNvPr>
           <p:cNvSpPr/>
@@ -15011,6 +15332,9 @@
             <a:extLst>
               <a:ext uri="{FF2B5EF4-FFF2-40B4-BE49-F238E27FC236}">
                 <a16:creationId xmlns:a16="http://schemas.microsoft.com/office/drawing/2014/main" id="{2640CC38-83D2-46C1-B14A-BB0AB8E9DBF9}"/>
+              </a:ext>
+              <a:ext uri="{C183D7F6-B498-43B3-948B-1728B52AA6E4}">
+                <adec:decorative xmlns:adec="http://schemas.microsoft.com/office/drawing/2017/decorative" val="1"/>
               </a:ext>
             </a:extLst>
           </p:cNvPr>
@@ -15477,6 +15801,9 @@
               <a:ext uri="{FF2B5EF4-FFF2-40B4-BE49-F238E27FC236}">
                 <a16:creationId xmlns:a16="http://schemas.microsoft.com/office/drawing/2014/main" id="{AB2489B4-C02A-4B76-9D97-92815883B76C}"/>
               </a:ext>
+              <a:ext uri="{C183D7F6-B498-43B3-948B-1728B52AA6E4}">
+                <adec:decorative xmlns:adec="http://schemas.microsoft.com/office/drawing/2017/decorative" val="1"/>
+              </a:ext>
             </a:extLst>
           </p:cNvPr>
           <p:cNvSpPr/>
@@ -15540,6 +15867,9 @@
               <a:ext uri="{FF2B5EF4-FFF2-40B4-BE49-F238E27FC236}">
                 <a16:creationId xmlns:a16="http://schemas.microsoft.com/office/drawing/2014/main" id="{2CFC08E3-97CE-4F1D-A241-772B68560239}"/>
               </a:ext>
+              <a:ext uri="{C183D7F6-B498-43B3-948B-1728B52AA6E4}">
+                <adec:decorative xmlns:adec="http://schemas.microsoft.com/office/drawing/2017/decorative" val="1"/>
+              </a:ext>
             </a:extLst>
           </p:cNvPr>
           <p:cNvSpPr/>
@@ -15891,7 +16221,193 @@
       </p:sp>
       <p:grpSp>
         <p:nvGrpSpPr>
-          <p:cNvPr id="24" name="Group 23">
+          <p:cNvPr id="25" name="Group 24" descr="write the content">
+            <a:extLst>
+              <a:ext uri="{FF2B5EF4-FFF2-40B4-BE49-F238E27FC236}">
+                <a16:creationId xmlns:a16="http://schemas.microsoft.com/office/drawing/2014/main" id="{85AE4A0C-4A60-4195-88B8-38E964E23610}"/>
+              </a:ext>
+            </a:extLst>
+          </p:cNvPr>
+          <p:cNvGrpSpPr/>
+          <p:nvPr/>
+        </p:nvGrpSpPr>
+        <p:grpSpPr>
+          <a:xfrm>
+            <a:off x="6096000" y="311566"/>
+            <a:ext cx="5486398" cy="1251286"/>
+            <a:chOff x="6096000" y="311566"/>
+            <a:chExt cx="5486398" cy="1251286"/>
+          </a:xfrm>
+        </p:grpSpPr>
+        <p:sp>
+          <p:nvSpPr>
+            <p:cNvPr id="19" name="Rectangle: Rounded Corners 18">
+              <a:extLst>
+                <a:ext uri="{FF2B5EF4-FFF2-40B4-BE49-F238E27FC236}">
+                  <a16:creationId xmlns:a16="http://schemas.microsoft.com/office/drawing/2014/main" id="{6568CE47-6A8D-4A73-87E2-B17E7F816C71}"/>
+                </a:ext>
+              </a:extLst>
+            </p:cNvPr>
+            <p:cNvSpPr/>
+            <p:nvPr/>
+          </p:nvSpPr>
+          <p:spPr>
+            <a:xfrm>
+              <a:off x="6769765" y="439904"/>
+              <a:ext cx="4812633" cy="994611"/>
+            </a:xfrm>
+            <a:prstGeom prst="roundRect">
+              <a:avLst/>
+            </a:prstGeom>
+            <a:solidFill>
+              <a:schemeClr val="bg2">
+                <a:lumMod val="25000"/>
+              </a:schemeClr>
+            </a:solidFill>
+            <a:ln>
+              <a:solidFill>
+                <a:schemeClr val="bg1"/>
+              </a:solidFill>
+            </a:ln>
+          </p:spPr>
+          <p:style>
+            <a:lnRef idx="2">
+              <a:schemeClr val="accent1">
+                <a:shade val="50000"/>
+              </a:schemeClr>
+            </a:lnRef>
+            <a:fillRef idx="1">
+              <a:schemeClr val="accent1"/>
+            </a:fillRef>
+            <a:effectRef idx="0">
+              <a:schemeClr val="accent1"/>
+            </a:effectRef>
+            <a:fontRef idx="minor">
+              <a:schemeClr val="lt1"/>
+            </a:fontRef>
+          </p:style>
+          <p:txBody>
+            <a:bodyPr rtlCol="0" anchor="ctr"/>
+            <a:lstStyle/>
+            <a:p>
+              <a:pPr algn="r"/>
+              <a:r>
+                <a:rPr lang="en-US" sz="2400" dirty="0">
+                  <a:latin typeface="Tahoma" panose="020B0604030504040204" pitchFamily="34" charset="0"/>
+                  <a:ea typeface="Tahoma" panose="020B0604030504040204" pitchFamily="34" charset="0"/>
+                  <a:cs typeface="Tahoma" panose="020B0604030504040204" pitchFamily="34" charset="0"/>
+                </a:rPr>
+                <a:t>Write the content</a:t>
+              </a:r>
+            </a:p>
+          </p:txBody>
+        </p:sp>
+        <p:sp>
+          <p:nvSpPr>
+            <p:cNvPr id="21" name="Oval 20">
+              <a:extLst>
+                <a:ext uri="{FF2B5EF4-FFF2-40B4-BE49-F238E27FC236}">
+                  <a16:creationId xmlns:a16="http://schemas.microsoft.com/office/drawing/2014/main" id="{70989FD4-2D06-485B-B46C-891ECE23F92E}"/>
+                </a:ext>
+              </a:extLst>
+            </p:cNvPr>
+            <p:cNvSpPr/>
+            <p:nvPr/>
+          </p:nvSpPr>
+          <p:spPr>
+            <a:xfrm>
+              <a:off x="6096000" y="311566"/>
+              <a:ext cx="1347532" cy="1251286"/>
+            </a:xfrm>
+            <a:prstGeom prst="ellipse">
+              <a:avLst/>
+            </a:prstGeom>
+            <a:solidFill>
+              <a:schemeClr val="accent1">
+                <a:lumMod val="75000"/>
+              </a:schemeClr>
+            </a:solidFill>
+            <a:ln>
+              <a:solidFill>
+                <a:schemeClr val="bg1"/>
+              </a:solidFill>
+            </a:ln>
+            <a:effectLst>
+              <a:outerShdw blurRad="50800" dist="38100" dir="2700000" algn="tl" rotWithShape="0">
+                <a:prstClr val="black">
+                  <a:alpha val="40000"/>
+                </a:prstClr>
+              </a:outerShdw>
+            </a:effectLst>
+          </p:spPr>
+          <p:style>
+            <a:lnRef idx="2">
+              <a:schemeClr val="accent1">
+                <a:shade val="50000"/>
+              </a:schemeClr>
+            </a:lnRef>
+            <a:fillRef idx="1">
+              <a:schemeClr val="accent1"/>
+            </a:fillRef>
+            <a:effectRef idx="0">
+              <a:schemeClr val="accent1"/>
+            </a:effectRef>
+            <a:fontRef idx="minor">
+              <a:schemeClr val="lt1"/>
+            </a:fontRef>
+          </p:style>
+          <p:txBody>
+            <a:bodyPr rtlCol="0" anchor="ctr"/>
+            <a:lstStyle/>
+            <a:p>
+              <a:pPr algn="ctr"/>
+              <a:endParaRPr lang="en-US"/>
+            </a:p>
+          </p:txBody>
+        </p:sp>
+        <p:pic>
+          <p:nvPicPr>
+            <p:cNvPr id="4" name="Graphic 3" descr="Pencil">
+              <a:extLst>
+                <a:ext uri="{FF2B5EF4-FFF2-40B4-BE49-F238E27FC236}">
+                  <a16:creationId xmlns:a16="http://schemas.microsoft.com/office/drawing/2014/main" id="{1B00DD10-4319-4F3F-9880-C5628C2B1F30}"/>
+                </a:ext>
+              </a:extLst>
+            </p:cNvPr>
+            <p:cNvPicPr>
+              <a:picLocks noChangeAspect="1"/>
+            </p:cNvPicPr>
+            <p:nvPr/>
+          </p:nvPicPr>
+          <p:blipFill>
+            <a:blip r:embed="rId3">
+              <a:extLst>
+                <a:ext uri="{28A0092B-C50C-407E-A947-70E740481C1C}">
+                  <a14:useLocalDpi xmlns:a14="http://schemas.microsoft.com/office/drawing/2010/main" val="0"/>
+                </a:ext>
+                <a:ext uri="{96DAC541-7B7A-43D3-8B79-37D633B846F1}">
+                  <asvg:svgBlip xmlns:asvg="http://schemas.microsoft.com/office/drawing/2016/SVG/main" r:embed="rId4"/>
+                </a:ext>
+              </a:extLst>
+            </a:blip>
+            <a:stretch>
+              <a:fillRect/>
+            </a:stretch>
+          </p:blipFill>
+          <p:spPr>
+            <a:xfrm>
+              <a:off x="6312565" y="476792"/>
+              <a:ext cx="914400" cy="914400"/>
+            </a:xfrm>
+            <a:prstGeom prst="rect">
+              <a:avLst/>
+            </a:prstGeom>
+          </p:spPr>
+        </p:pic>
+      </p:grpSp>
+      <p:grpSp>
+        <p:nvGrpSpPr>
+          <p:cNvPr id="24" name="Group 23" descr="consider tips, notes, and warnings">
             <a:extLst>
               <a:ext uri="{FF2B5EF4-FFF2-40B4-BE49-F238E27FC236}">
                 <a16:creationId xmlns:a16="http://schemas.microsoft.com/office/drawing/2014/main" id="{DDC49D31-0E50-4D21-A5B9-6D1DF034E03B}"/>
@@ -16065,13 +16581,13 @@
             <p:nvPr/>
           </p:nvPicPr>
           <p:blipFill>
-            <a:blip r:embed="rId3">
+            <a:blip r:embed="rId5">
               <a:extLst>
                 <a:ext uri="{28A0092B-C50C-407E-A947-70E740481C1C}">
                   <a14:useLocalDpi xmlns:a14="http://schemas.microsoft.com/office/drawing/2010/main" val="0"/>
                 </a:ext>
                 <a:ext uri="{96DAC541-7B7A-43D3-8B79-37D633B846F1}">
-                  <asvg:svgBlip xmlns:asvg="http://schemas.microsoft.com/office/drawing/2016/SVG/main" r:embed="rId4"/>
+                  <asvg:svgBlip xmlns:asvg="http://schemas.microsoft.com/office/drawing/2016/SVG/main" r:embed="rId6"/>
                 </a:ext>
               </a:extLst>
             </a:blip>
@@ -16092,7 +16608,7 @@
       </p:grpSp>
       <p:grpSp>
         <p:nvGrpSpPr>
-          <p:cNvPr id="6" name="Group 5">
+          <p:cNvPr id="6" name="Group 5" descr="reorganize content">
             <a:extLst>
               <a:ext uri="{FF2B5EF4-FFF2-40B4-BE49-F238E27FC236}">
                 <a16:creationId xmlns:a16="http://schemas.microsoft.com/office/drawing/2014/main" id="{7A3C312B-CD57-4B7B-94FD-61AEE248A548}"/>
@@ -16251,13 +16767,13 @@
             <p:nvPr/>
           </p:nvPicPr>
           <p:blipFill>
-            <a:blip r:embed="rId5">
+            <a:blip r:embed="rId7">
               <a:extLst>
                 <a:ext uri="{28A0092B-C50C-407E-A947-70E740481C1C}">
                   <a14:useLocalDpi xmlns:a14="http://schemas.microsoft.com/office/drawing/2010/main" val="0"/>
                 </a:ext>
                 <a:ext uri="{96DAC541-7B7A-43D3-8B79-37D633B846F1}">
-                  <asvg:svgBlip xmlns:asvg="http://schemas.microsoft.com/office/drawing/2016/SVG/main" r:embed="rId6"/>
+                  <asvg:svgBlip xmlns:asvg="http://schemas.microsoft.com/office/drawing/2016/SVG/main" r:embed="rId8"/>
                 </a:ext>
               </a:extLst>
             </a:blip>
@@ -16278,7 +16794,7 @@
       </p:grpSp>
       <p:grpSp>
         <p:nvGrpSpPr>
-          <p:cNvPr id="5" name="Group 4">
+          <p:cNvPr id="5" name="Group 4" descr="take screenshots">
             <a:extLst>
               <a:ext uri="{FF2B5EF4-FFF2-40B4-BE49-F238E27FC236}">
                 <a16:creationId xmlns:a16="http://schemas.microsoft.com/office/drawing/2014/main" id="{D82E720A-B116-419B-8479-49CA3C01B92B}"/>
@@ -16437,192 +16953,6 @@
             <p:nvPr/>
           </p:nvPicPr>
           <p:blipFill>
-            <a:blip r:embed="rId7">
-              <a:extLst>
-                <a:ext uri="{28A0092B-C50C-407E-A947-70E740481C1C}">
-                  <a14:useLocalDpi xmlns:a14="http://schemas.microsoft.com/office/drawing/2010/main" val="0"/>
-                </a:ext>
-                <a:ext uri="{96DAC541-7B7A-43D3-8B79-37D633B846F1}">
-                  <asvg:svgBlip xmlns:asvg="http://schemas.microsoft.com/office/drawing/2016/SVG/main" r:embed="rId8"/>
-                </a:ext>
-              </a:extLst>
-            </a:blip>
-            <a:stretch>
-              <a:fillRect/>
-            </a:stretch>
-          </p:blipFill>
-          <p:spPr>
-            <a:xfrm>
-              <a:off x="6312565" y="5478918"/>
-              <a:ext cx="914400" cy="914400"/>
-            </a:xfrm>
-            <a:prstGeom prst="rect">
-              <a:avLst/>
-            </a:prstGeom>
-          </p:spPr>
-        </p:pic>
-      </p:grpSp>
-      <p:grpSp>
-        <p:nvGrpSpPr>
-          <p:cNvPr id="25" name="Group 24">
-            <a:extLst>
-              <a:ext uri="{FF2B5EF4-FFF2-40B4-BE49-F238E27FC236}">
-                <a16:creationId xmlns:a16="http://schemas.microsoft.com/office/drawing/2014/main" id="{85AE4A0C-4A60-4195-88B8-38E964E23610}"/>
-              </a:ext>
-            </a:extLst>
-          </p:cNvPr>
-          <p:cNvGrpSpPr/>
-          <p:nvPr/>
-        </p:nvGrpSpPr>
-        <p:grpSpPr>
-          <a:xfrm>
-            <a:off x="6096000" y="311566"/>
-            <a:ext cx="5486398" cy="1251286"/>
-            <a:chOff x="6096000" y="311566"/>
-            <a:chExt cx="5486398" cy="1251286"/>
-          </a:xfrm>
-        </p:grpSpPr>
-        <p:sp>
-          <p:nvSpPr>
-            <p:cNvPr id="19" name="Rectangle: Rounded Corners 18">
-              <a:extLst>
-                <a:ext uri="{FF2B5EF4-FFF2-40B4-BE49-F238E27FC236}">
-                  <a16:creationId xmlns:a16="http://schemas.microsoft.com/office/drawing/2014/main" id="{6568CE47-6A8D-4A73-87E2-B17E7F816C71}"/>
-                </a:ext>
-              </a:extLst>
-            </p:cNvPr>
-            <p:cNvSpPr/>
-            <p:nvPr/>
-          </p:nvSpPr>
-          <p:spPr>
-            <a:xfrm>
-              <a:off x="6769765" y="439904"/>
-              <a:ext cx="4812633" cy="994611"/>
-            </a:xfrm>
-            <a:prstGeom prst="roundRect">
-              <a:avLst/>
-            </a:prstGeom>
-            <a:solidFill>
-              <a:schemeClr val="bg2">
-                <a:lumMod val="25000"/>
-              </a:schemeClr>
-            </a:solidFill>
-            <a:ln>
-              <a:solidFill>
-                <a:schemeClr val="bg1"/>
-              </a:solidFill>
-            </a:ln>
-          </p:spPr>
-          <p:style>
-            <a:lnRef idx="2">
-              <a:schemeClr val="accent1">
-                <a:shade val="50000"/>
-              </a:schemeClr>
-            </a:lnRef>
-            <a:fillRef idx="1">
-              <a:schemeClr val="accent1"/>
-            </a:fillRef>
-            <a:effectRef idx="0">
-              <a:schemeClr val="accent1"/>
-            </a:effectRef>
-            <a:fontRef idx="minor">
-              <a:schemeClr val="lt1"/>
-            </a:fontRef>
-          </p:style>
-          <p:txBody>
-            <a:bodyPr rtlCol="0" anchor="ctr"/>
-            <a:lstStyle/>
-            <a:p>
-              <a:pPr algn="r"/>
-              <a:r>
-                <a:rPr lang="en-US" sz="2400" dirty="0">
-                  <a:latin typeface="Tahoma" panose="020B0604030504040204" pitchFamily="34" charset="0"/>
-                  <a:ea typeface="Tahoma" panose="020B0604030504040204" pitchFamily="34" charset="0"/>
-                  <a:cs typeface="Tahoma" panose="020B0604030504040204" pitchFamily="34" charset="0"/>
-                </a:rPr>
-                <a:t>Write the content</a:t>
-              </a:r>
-            </a:p>
-          </p:txBody>
-        </p:sp>
-        <p:sp>
-          <p:nvSpPr>
-            <p:cNvPr id="21" name="Oval 20">
-              <a:extLst>
-                <a:ext uri="{FF2B5EF4-FFF2-40B4-BE49-F238E27FC236}">
-                  <a16:creationId xmlns:a16="http://schemas.microsoft.com/office/drawing/2014/main" id="{70989FD4-2D06-485B-B46C-891ECE23F92E}"/>
-                </a:ext>
-              </a:extLst>
-            </p:cNvPr>
-            <p:cNvSpPr/>
-            <p:nvPr/>
-          </p:nvSpPr>
-          <p:spPr>
-            <a:xfrm>
-              <a:off x="6096000" y="311566"/>
-              <a:ext cx="1347532" cy="1251286"/>
-            </a:xfrm>
-            <a:prstGeom prst="ellipse">
-              <a:avLst/>
-            </a:prstGeom>
-            <a:solidFill>
-              <a:schemeClr val="accent1">
-                <a:lumMod val="75000"/>
-              </a:schemeClr>
-            </a:solidFill>
-            <a:ln>
-              <a:solidFill>
-                <a:schemeClr val="bg1"/>
-              </a:solidFill>
-            </a:ln>
-            <a:effectLst>
-              <a:outerShdw blurRad="50800" dist="38100" dir="2700000" algn="tl" rotWithShape="0">
-                <a:prstClr val="black">
-                  <a:alpha val="40000"/>
-                </a:prstClr>
-              </a:outerShdw>
-            </a:effectLst>
-          </p:spPr>
-          <p:style>
-            <a:lnRef idx="2">
-              <a:schemeClr val="accent1">
-                <a:shade val="50000"/>
-              </a:schemeClr>
-            </a:lnRef>
-            <a:fillRef idx="1">
-              <a:schemeClr val="accent1"/>
-            </a:fillRef>
-            <a:effectRef idx="0">
-              <a:schemeClr val="accent1"/>
-            </a:effectRef>
-            <a:fontRef idx="minor">
-              <a:schemeClr val="lt1"/>
-            </a:fontRef>
-          </p:style>
-          <p:txBody>
-            <a:bodyPr rtlCol="0" anchor="ctr"/>
-            <a:lstStyle/>
-            <a:p>
-              <a:pPr algn="ctr"/>
-              <a:endParaRPr lang="en-US"/>
-            </a:p>
-          </p:txBody>
-        </p:sp>
-        <p:pic>
-          <p:nvPicPr>
-            <p:cNvPr id="4" name="Graphic 3" descr="Pencil">
-              <a:extLst>
-                <a:ext uri="{FF2B5EF4-FFF2-40B4-BE49-F238E27FC236}">
-                  <a16:creationId xmlns:a16="http://schemas.microsoft.com/office/drawing/2014/main" id="{1B00DD10-4319-4F3F-9880-C5628C2B1F30}"/>
-                </a:ext>
-              </a:extLst>
-            </p:cNvPr>
-            <p:cNvPicPr>
-              <a:picLocks noChangeAspect="1"/>
-            </p:cNvPicPr>
-            <p:nvPr/>
-          </p:nvPicPr>
-          <p:blipFill>
             <a:blip r:embed="rId9">
               <a:extLst>
                 <a:ext uri="{28A0092B-C50C-407E-A947-70E740481C1C}">
@@ -16639,7 +16969,7 @@
           </p:blipFill>
           <p:spPr>
             <a:xfrm>
-              <a:off x="6312565" y="476792"/>
+              <a:off x="6312565" y="5478918"/>
               <a:ext cx="914400" cy="914400"/>
             </a:xfrm>
             <a:prstGeom prst="rect">
@@ -16880,6 +17210,9 @@
               <a:ext uri="{FF2B5EF4-FFF2-40B4-BE49-F238E27FC236}">
                 <a16:creationId xmlns:a16="http://schemas.microsoft.com/office/drawing/2014/main" id="{4B11F372-BD8A-489E-84FC-FC5121571CEF}"/>
               </a:ext>
+              <a:ext uri="{C183D7F6-B498-43B3-948B-1728B52AA6E4}">
+                <adec:decorative xmlns:adec="http://schemas.microsoft.com/office/drawing/2017/decorative" val="1"/>
+              </a:ext>
             </a:extLst>
           </p:cNvPr>
           <p:cNvSpPr/>
@@ -16943,6 +17276,9 @@
               <a:ext uri="{FF2B5EF4-FFF2-40B4-BE49-F238E27FC236}">
                 <a16:creationId xmlns:a16="http://schemas.microsoft.com/office/drawing/2014/main" id="{4FAA73A2-9022-4A2A-9B31-DE26CEA5F2E7}"/>
               </a:ext>
+              <a:ext uri="{C183D7F6-B498-43B3-948B-1728B52AA6E4}">
+                <adec:decorative xmlns:adec="http://schemas.microsoft.com/office/drawing/2017/decorative" val="1"/>
+              </a:ext>
             </a:extLst>
           </p:cNvPr>
           <p:cNvSpPr/>
@@ -17068,6 +17404,9 @@
             <a:extLst>
               <a:ext uri="{FF2B5EF4-FFF2-40B4-BE49-F238E27FC236}">
                 <a16:creationId xmlns:a16="http://schemas.microsoft.com/office/drawing/2014/main" id="{9BD6EC56-10AA-4C55-AA60-A1884220286B}"/>
+              </a:ext>
+              <a:ext uri="{C183D7F6-B498-43B3-948B-1728B52AA6E4}">
+                <adec:decorative xmlns:adec="http://schemas.microsoft.com/office/drawing/2017/decorative" val="1"/>
               </a:ext>
             </a:extLst>
           </p:cNvPr>
@@ -17344,6 +17683,69 @@
       </p:sp>
       <p:sp>
         <p:nvSpPr>
+          <p:cNvPr id="7" name="Rectangle: Rounded Corners 6">
+            <a:extLst>
+              <a:ext uri="{FF2B5EF4-FFF2-40B4-BE49-F238E27FC236}">
+                <a16:creationId xmlns:a16="http://schemas.microsoft.com/office/drawing/2014/main" id="{2FEDB523-DC7B-4CA3-91C1-19B5ECE014D7}"/>
+              </a:ext>
+            </a:extLst>
+          </p:cNvPr>
+          <p:cNvSpPr/>
+          <p:nvPr/>
+        </p:nvSpPr>
+        <p:spPr>
+          <a:xfrm>
+            <a:off x="6096000" y="2136510"/>
+            <a:ext cx="5418635" cy="994611"/>
+          </a:xfrm>
+          <a:prstGeom prst="roundRect">
+            <a:avLst/>
+          </a:prstGeom>
+          <a:solidFill>
+            <a:schemeClr val="bg2">
+              <a:lumMod val="25000"/>
+            </a:schemeClr>
+          </a:solidFill>
+          <a:ln>
+            <a:solidFill>
+              <a:schemeClr val="bg1"/>
+            </a:solidFill>
+          </a:ln>
+        </p:spPr>
+        <p:style>
+          <a:lnRef idx="2">
+            <a:schemeClr val="accent1">
+              <a:shade val="50000"/>
+            </a:schemeClr>
+          </a:lnRef>
+          <a:fillRef idx="1">
+            <a:schemeClr val="accent1"/>
+          </a:fillRef>
+          <a:effectRef idx="0">
+            <a:schemeClr val="accent1"/>
+          </a:effectRef>
+          <a:fontRef idx="minor">
+            <a:schemeClr val="lt1"/>
+          </a:fontRef>
+        </p:style>
+        <p:txBody>
+          <a:bodyPr rtlCol="0" anchor="ctr"/>
+          <a:lstStyle/>
+          <a:p>
+            <a:pPr algn="r"/>
+            <a:r>
+              <a:rPr lang="en-US" sz="2400" dirty="0">
+                <a:latin typeface="Tahoma" panose="020B0604030504040204" pitchFamily="34" charset="0"/>
+                <a:ea typeface="Tahoma" panose="020B0604030504040204" pitchFamily="34" charset="0"/>
+                <a:cs typeface="Tahoma" panose="020B0604030504040204" pitchFamily="34" charset="0"/>
+              </a:rPr>
+              <a:t>Build the outputs for distribution</a:t>
+            </a:r>
+          </a:p>
+        </p:txBody>
+      </p:sp>
+      <p:sp>
+        <p:nvSpPr>
           <p:cNvPr id="4" name="Rectangle: Rounded Corners 3">
             <a:extLst>
               <a:ext uri="{FF2B5EF4-FFF2-40B4-BE49-F238E27FC236}">
@@ -17411,6 +17813,9 @@
             <a:extLst>
               <a:ext uri="{FF2B5EF4-FFF2-40B4-BE49-F238E27FC236}">
                 <a16:creationId xmlns:a16="http://schemas.microsoft.com/office/drawing/2014/main" id="{1172D80E-74B6-4B3F-B56E-34450A45C8C6}"/>
+              </a:ext>
+              <a:ext uri="{C183D7F6-B498-43B3-948B-1728B52AA6E4}">
+                <adec:decorative xmlns:adec="http://schemas.microsoft.com/office/drawing/2017/decorative" val="1"/>
               </a:ext>
             </a:extLst>
           </p:cNvPr>
@@ -17509,73 +17914,13 @@
       </p:pic>
       <p:sp>
         <p:nvSpPr>
-          <p:cNvPr id="7" name="Rectangle: Rounded Corners 6">
-            <a:extLst>
-              <a:ext uri="{FF2B5EF4-FFF2-40B4-BE49-F238E27FC236}">
-                <a16:creationId xmlns:a16="http://schemas.microsoft.com/office/drawing/2014/main" id="{2FEDB523-DC7B-4CA3-91C1-19B5ECE014D7}"/>
-              </a:ext>
-            </a:extLst>
-          </p:cNvPr>
-          <p:cNvSpPr/>
-          <p:nvPr/>
-        </p:nvSpPr>
-        <p:spPr>
-          <a:xfrm>
-            <a:off x="6096000" y="2136510"/>
-            <a:ext cx="5418635" cy="994611"/>
-          </a:xfrm>
-          <a:prstGeom prst="roundRect">
-            <a:avLst/>
-          </a:prstGeom>
-          <a:solidFill>
-            <a:schemeClr val="bg2">
-              <a:lumMod val="25000"/>
-            </a:schemeClr>
-          </a:solidFill>
-          <a:ln>
-            <a:solidFill>
-              <a:schemeClr val="bg1"/>
-            </a:solidFill>
-          </a:ln>
-        </p:spPr>
-        <p:style>
-          <a:lnRef idx="2">
-            <a:schemeClr val="accent1">
-              <a:shade val="50000"/>
-            </a:schemeClr>
-          </a:lnRef>
-          <a:fillRef idx="1">
-            <a:schemeClr val="accent1"/>
-          </a:fillRef>
-          <a:effectRef idx="0">
-            <a:schemeClr val="accent1"/>
-          </a:effectRef>
-          <a:fontRef idx="minor">
-            <a:schemeClr val="lt1"/>
-          </a:fontRef>
-        </p:style>
-        <p:txBody>
-          <a:bodyPr rtlCol="0" anchor="ctr"/>
-          <a:lstStyle/>
-          <a:p>
-            <a:pPr algn="r"/>
-            <a:r>
-              <a:rPr lang="en-US" sz="2400" dirty="0">
-                <a:latin typeface="Tahoma" panose="020B0604030504040204" pitchFamily="34" charset="0"/>
-                <a:ea typeface="Tahoma" panose="020B0604030504040204" pitchFamily="34" charset="0"/>
-                <a:cs typeface="Tahoma" panose="020B0604030504040204" pitchFamily="34" charset="0"/>
-              </a:rPr>
-              <a:t>Build the outputs for distribution</a:t>
-            </a:r>
-          </a:p>
-        </p:txBody>
-      </p:sp>
-      <p:sp>
-        <p:nvSpPr>
           <p:cNvPr id="8" name="Oval 7">
             <a:extLst>
               <a:ext uri="{FF2B5EF4-FFF2-40B4-BE49-F238E27FC236}">
                 <a16:creationId xmlns:a16="http://schemas.microsoft.com/office/drawing/2014/main" id="{587D0497-78A2-4ABB-A75D-2884D509A066}"/>
+              </a:ext>
+              <a:ext uri="{C183D7F6-B498-43B3-948B-1728B52AA6E4}">
+                <adec:decorative xmlns:adec="http://schemas.microsoft.com/office/drawing/2017/decorative" val="1"/>
               </a:ext>
             </a:extLst>
           </p:cNvPr>
@@ -18440,6 +18785,9 @@
               <a:ext uri="{FF2B5EF4-FFF2-40B4-BE49-F238E27FC236}">
                 <a16:creationId xmlns:a16="http://schemas.microsoft.com/office/drawing/2014/main" id="{DB8B70FF-B4B3-4CDD-95FB-7F28335D326E}"/>
               </a:ext>
+              <a:ext uri="{C183D7F6-B498-43B3-948B-1728B52AA6E4}">
+                <adec:decorative xmlns:adec="http://schemas.microsoft.com/office/drawing/2017/decorative" val="1"/>
+              </a:ext>
             </a:extLst>
           </p:cNvPr>
           <p:cNvSpPr/>
@@ -18503,6 +18851,9 @@
               <a:ext uri="{FF2B5EF4-FFF2-40B4-BE49-F238E27FC236}">
                 <a16:creationId xmlns:a16="http://schemas.microsoft.com/office/drawing/2014/main" id="{35CAA934-910E-43C9-AFED-9A6624082EBF}"/>
               </a:ext>
+              <a:ext uri="{C183D7F6-B498-43B3-948B-1728B52AA6E4}">
+                <adec:decorative xmlns:adec="http://schemas.microsoft.com/office/drawing/2017/decorative" val="1"/>
+              </a:ext>
             </a:extLst>
           </p:cNvPr>
           <p:cNvSpPr/>
@@ -18566,6 +18917,9 @@
               <a:ext uri="{FF2B5EF4-FFF2-40B4-BE49-F238E27FC236}">
                 <a16:creationId xmlns:a16="http://schemas.microsoft.com/office/drawing/2014/main" id="{D184595D-A985-460C-A3D0-9AE9CCB5B3AB}"/>
               </a:ext>
+              <a:ext uri="{C183D7F6-B498-43B3-948B-1728B52AA6E4}">
+                <adec:decorative xmlns:adec="http://schemas.microsoft.com/office/drawing/2017/decorative" val="1"/>
+              </a:ext>
             </a:extLst>
           </p:cNvPr>
           <p:cNvSpPr/>
@@ -18629,6 +18983,9 @@
               <a:ext uri="{FF2B5EF4-FFF2-40B4-BE49-F238E27FC236}">
                 <a16:creationId xmlns:a16="http://schemas.microsoft.com/office/drawing/2014/main" id="{943452F2-EAB8-4153-9025-72F2162E8571}"/>
               </a:ext>
+              <a:ext uri="{C183D7F6-B498-43B3-948B-1728B52AA6E4}">
+                <adec:decorative xmlns:adec="http://schemas.microsoft.com/office/drawing/2017/decorative" val="1"/>
+              </a:ext>
             </a:extLst>
           </p:cNvPr>
           <p:cNvSpPr/>
@@ -18843,7 +19200,7 @@
       </p:pic>
       <p:sp>
         <p:nvSpPr>
-          <p:cNvPr id="31" name="Rectangle 30">
+          <p:cNvPr id="31" name="Rectangle 30" descr="Design">
             <a:hlinkClick r:id="rId15" action="ppaction://hlinksldjump"/>
             <a:extLst>
               <a:ext uri="{FF2B5EF4-FFF2-40B4-BE49-F238E27FC236}">
@@ -18888,7 +19245,7 @@
           <a:lstStyle/>
           <a:p>
             <a:pPr algn="ctr"/>
-            <a:endParaRPr lang="en-US"/>
+            <a:endParaRPr lang="en-US" dirty="0"/>
           </a:p>
         </p:txBody>
       </p:sp>
@@ -19872,6 +20229,9 @@
               <a:ext uri="{FF2B5EF4-FFF2-40B4-BE49-F238E27FC236}">
                 <a16:creationId xmlns:a16="http://schemas.microsoft.com/office/drawing/2014/main" id="{DB8B70FF-B4B3-4CDD-95FB-7F28335D326E}"/>
               </a:ext>
+              <a:ext uri="{C183D7F6-B498-43B3-948B-1728B52AA6E4}">
+                <adec:decorative xmlns:adec="http://schemas.microsoft.com/office/drawing/2017/decorative" val="1"/>
+              </a:ext>
             </a:extLst>
           </p:cNvPr>
           <p:cNvSpPr/>
@@ -19935,6 +20295,9 @@
               <a:ext uri="{FF2B5EF4-FFF2-40B4-BE49-F238E27FC236}">
                 <a16:creationId xmlns:a16="http://schemas.microsoft.com/office/drawing/2014/main" id="{35CAA934-910E-43C9-AFED-9A6624082EBF}"/>
               </a:ext>
+              <a:ext uri="{C183D7F6-B498-43B3-948B-1728B52AA6E4}">
+                <adec:decorative xmlns:adec="http://schemas.microsoft.com/office/drawing/2017/decorative" val="1"/>
+              </a:ext>
             </a:extLst>
           </p:cNvPr>
           <p:cNvSpPr/>
@@ -20337,6 +20700,9 @@
               <a:ext uri="{FF2B5EF4-FFF2-40B4-BE49-F238E27FC236}">
                 <a16:creationId xmlns:a16="http://schemas.microsoft.com/office/drawing/2014/main" id="{6D905CB5-3799-4A84-BFCA-A92262623B37}"/>
               </a:ext>
+              <a:ext uri="{C183D7F6-B498-43B3-948B-1728B52AA6E4}">
+                <adec:decorative xmlns:adec="http://schemas.microsoft.com/office/drawing/2017/decorative" val="1"/>
+              </a:ext>
             </a:extLst>
           </p:cNvPr>
           <p:cNvSpPr/>
@@ -20400,6 +20766,9 @@
               <a:ext uri="{FF2B5EF4-FFF2-40B4-BE49-F238E27FC236}">
                 <a16:creationId xmlns:a16="http://schemas.microsoft.com/office/drawing/2014/main" id="{4FF87671-2CD2-4EF9-9AC9-F8E914162808}"/>
               </a:ext>
+              <a:ext uri="{C183D7F6-B498-43B3-948B-1728B52AA6E4}">
+                <adec:decorative xmlns:adec="http://schemas.microsoft.com/office/drawing/2017/decorative" val="1"/>
+              </a:ext>
             </a:extLst>
           </p:cNvPr>
           <p:cNvSpPr/>
@@ -20525,6 +20894,9 @@
             <a:extLst>
               <a:ext uri="{FF2B5EF4-FFF2-40B4-BE49-F238E27FC236}">
                 <a16:creationId xmlns:a16="http://schemas.microsoft.com/office/drawing/2014/main" id="{2F4520BE-2380-47F5-9E12-6CAE4AB044CA}"/>
+              </a:ext>
+              <a:ext uri="{C183D7F6-B498-43B3-948B-1728B52AA6E4}">
+                <adec:decorative xmlns:adec="http://schemas.microsoft.com/office/drawing/2017/decorative" val="1"/>
               </a:ext>
             </a:extLst>
           </p:cNvPr>

</xml_diff>

<commit_message>
bootstrap call fix and disable js
</commit_message>
<xml_diff>
--- a/Doc Creation and Enhancement.pptx
+++ b/Doc Creation and Enhancement.pptx
@@ -137,7 +137,6 @@
 <p1510:revInfo xmlns:a="http://schemas.openxmlformats.org/drawingml/2006/main" xmlns:r="http://schemas.openxmlformats.org/officeDocument/2006/relationships" xmlns:p1510="http://schemas.microsoft.com/office/powerpoint/2015/10/main">
   <p1510:revLst>
     <p1510:client id="{12583CBE-9CCD-48A9-9186-39DB3A796354}" v="122" dt="2024-02-08T06:53:24.763"/>
-    <p1510:client id="{7ABF1419-CD27-4A5C-8858-89463FC83654}" v="9" dt="2024-02-08T05:40:46.040"/>
   </p1510:revLst>
 </p1510:revInfo>
 </file>
@@ -348,7 +347,7 @@
   <pc:docChgLst>
     <pc:chgData name="Jessica Ricks" userId="0490f4fba56e256d" providerId="LiveId" clId="{12583CBE-9CCD-48A9-9186-39DB3A796354}"/>
     <pc:docChg chg="undo custSel modSld">
-      <pc:chgData name="Jessica Ricks" userId="0490f4fba56e256d" providerId="LiveId" clId="{12583CBE-9CCD-48A9-9186-39DB3A796354}" dt="2024-02-08T06:56:55.552" v="546" actId="13244"/>
+      <pc:chgData name="Jessica Ricks" userId="0490f4fba56e256d" providerId="LiveId" clId="{12583CBE-9CCD-48A9-9186-39DB3A796354}" dt="2024-02-13T03:40:00.051" v="547" actId="1076"/>
       <pc:docMkLst>
         <pc:docMk/>
       </pc:docMkLst>
@@ -793,7 +792,7 @@
         </pc:sldMkLst>
       </pc:sldChg>
       <pc:sldChg chg="addSp delSp modSp mod setBg">
-        <pc:chgData name="Jessica Ricks" userId="0490f4fba56e256d" providerId="LiveId" clId="{12583CBE-9CCD-48A9-9186-39DB3A796354}" dt="2024-02-08T06:51:55.853" v="216" actId="962"/>
+        <pc:chgData name="Jessica Ricks" userId="0490f4fba56e256d" providerId="LiveId" clId="{12583CBE-9CCD-48A9-9186-39DB3A796354}" dt="2024-02-13T03:40:00.051" v="547" actId="1076"/>
         <pc:sldMkLst>
           <pc:docMk/>
           <pc:sldMk cId="513399631" sldId="279"/>
@@ -839,7 +838,7 @@
           </ac:spMkLst>
         </pc:spChg>
         <pc:grpChg chg="add mod">
-          <ac:chgData name="Jessica Ricks" userId="0490f4fba56e256d" providerId="LiveId" clId="{12583CBE-9CCD-48A9-9186-39DB3A796354}" dt="2024-02-08T06:51:55.853" v="216" actId="962"/>
+          <ac:chgData name="Jessica Ricks" userId="0490f4fba56e256d" providerId="LiveId" clId="{12583CBE-9CCD-48A9-9186-39DB3A796354}" dt="2024-02-13T03:40:00.051" v="547" actId="1076"/>
           <ac:grpSpMkLst>
             <pc:docMk/>
             <pc:sldMk cId="513399631" sldId="279"/>
@@ -7978,7 +7977,7 @@
           <a:p>
             <a:fld id="{8FEC2210-9658-48ED-8A35-B6F75BA7F1DE}" type="datetimeFigureOut">
               <a:rPr lang="en-US" smtClean="0"/>
-              <a:t>2/7/2024</a:t>
+              <a:t>2/12/2024</a:t>
             </a:fld>
             <a:endParaRPr lang="en-US"/>
           </a:p>
@@ -10520,7 +10519,7 @@
           <a:p>
             <a:fld id="{A2105B53-A7C4-4AEA-8593-902643ECDC3B}" type="datetimeFigureOut">
               <a:rPr lang="en-US" smtClean="0"/>
-              <a:t>2/7/2024</a:t>
+              <a:t>2/12/2024</a:t>
             </a:fld>
             <a:endParaRPr lang="en-US"/>
           </a:p>
@@ -10718,7 +10717,7 @@
           <a:p>
             <a:fld id="{A2105B53-A7C4-4AEA-8593-902643ECDC3B}" type="datetimeFigureOut">
               <a:rPr lang="en-US" smtClean="0"/>
-              <a:t>2/7/2024</a:t>
+              <a:t>2/12/2024</a:t>
             </a:fld>
             <a:endParaRPr lang="en-US"/>
           </a:p>
@@ -10926,7 +10925,7 @@
           <a:p>
             <a:fld id="{A2105B53-A7C4-4AEA-8593-902643ECDC3B}" type="datetimeFigureOut">
               <a:rPr lang="en-US" smtClean="0"/>
-              <a:t>2/7/2024</a:t>
+              <a:t>2/12/2024</a:t>
             </a:fld>
             <a:endParaRPr lang="en-US"/>
           </a:p>
@@ -11124,7 +11123,7 @@
           <a:p>
             <a:fld id="{A2105B53-A7C4-4AEA-8593-902643ECDC3B}" type="datetimeFigureOut">
               <a:rPr lang="en-US" smtClean="0"/>
-              <a:t>2/7/2024</a:t>
+              <a:t>2/12/2024</a:t>
             </a:fld>
             <a:endParaRPr lang="en-US"/>
           </a:p>
@@ -11399,7 +11398,7 @@
           <a:p>
             <a:fld id="{A2105B53-A7C4-4AEA-8593-902643ECDC3B}" type="datetimeFigureOut">
               <a:rPr lang="en-US" smtClean="0"/>
-              <a:t>2/7/2024</a:t>
+              <a:t>2/12/2024</a:t>
             </a:fld>
             <a:endParaRPr lang="en-US"/>
           </a:p>
@@ -11664,7 +11663,7 @@
           <a:p>
             <a:fld id="{A2105B53-A7C4-4AEA-8593-902643ECDC3B}" type="datetimeFigureOut">
               <a:rPr lang="en-US" smtClean="0"/>
-              <a:t>2/7/2024</a:t>
+              <a:t>2/12/2024</a:t>
             </a:fld>
             <a:endParaRPr lang="en-US"/>
           </a:p>
@@ -12076,7 +12075,7 @@
           <a:p>
             <a:fld id="{A2105B53-A7C4-4AEA-8593-902643ECDC3B}" type="datetimeFigureOut">
               <a:rPr lang="en-US" smtClean="0"/>
-              <a:t>2/7/2024</a:t>
+              <a:t>2/12/2024</a:t>
             </a:fld>
             <a:endParaRPr lang="en-US"/>
           </a:p>
@@ -12217,7 +12216,7 @@
           <a:p>
             <a:fld id="{A2105B53-A7C4-4AEA-8593-902643ECDC3B}" type="datetimeFigureOut">
               <a:rPr lang="en-US" smtClean="0"/>
-              <a:t>2/7/2024</a:t>
+              <a:t>2/12/2024</a:t>
             </a:fld>
             <a:endParaRPr lang="en-US"/>
           </a:p>
@@ -12330,7 +12329,7 @@
           <a:p>
             <a:fld id="{A2105B53-A7C4-4AEA-8593-902643ECDC3B}" type="datetimeFigureOut">
               <a:rPr lang="en-US" smtClean="0"/>
-              <a:t>2/7/2024</a:t>
+              <a:t>2/12/2024</a:t>
             </a:fld>
             <a:endParaRPr lang="en-US"/>
           </a:p>
@@ -12641,7 +12640,7 @@
           <a:p>
             <a:fld id="{A2105B53-A7C4-4AEA-8593-902643ECDC3B}" type="datetimeFigureOut">
               <a:rPr lang="en-US" smtClean="0"/>
-              <a:t>2/7/2024</a:t>
+              <a:t>2/12/2024</a:t>
             </a:fld>
             <a:endParaRPr lang="en-US"/>
           </a:p>
@@ -12929,7 +12928,7 @@
           <a:p>
             <a:fld id="{A2105B53-A7C4-4AEA-8593-902643ECDC3B}" type="datetimeFigureOut">
               <a:rPr lang="en-US" smtClean="0"/>
-              <a:t>2/7/2024</a:t>
+              <a:t>2/12/2024</a:t>
             </a:fld>
             <a:endParaRPr lang="en-US"/>
           </a:p>
@@ -13170,7 +13169,7 @@
           <a:p>
             <a:fld id="{A2105B53-A7C4-4AEA-8593-902643ECDC3B}" type="datetimeFigureOut">
               <a:rPr lang="en-US" smtClean="0"/>
-              <a:t>2/7/2024</a:t>
+              <a:t>2/12/2024</a:t>
             </a:fld>
             <a:endParaRPr lang="en-US"/>
           </a:p>
@@ -13698,7 +13697,7 @@
         </p:nvGrpSpPr>
         <p:grpSpPr>
           <a:xfrm>
-            <a:off x="1" y="0"/>
+            <a:off x="139700" y="153279"/>
             <a:ext cx="6705600" cy="5599987"/>
             <a:chOff x="1" y="0"/>
             <a:chExt cx="6705600" cy="5599987"/>

</xml_diff>

<commit_message>
combined two docs to md file
</commit_message>
<xml_diff>
--- a/Doc Creation and Enhancement.pptx
+++ b/Doc Creation and Enhancement.pptx
@@ -136,7 +136,7 @@
 <file path=ppt/revisionInfo.xml><?xml version="1.0" encoding="utf-8"?>
 <p1510:revInfo xmlns:a="http://schemas.openxmlformats.org/drawingml/2006/main" xmlns:r="http://schemas.openxmlformats.org/officeDocument/2006/relationships" xmlns:p1510="http://schemas.microsoft.com/office/powerpoint/2015/10/main">
   <p1510:revLst>
-    <p1510:client id="{12583CBE-9CCD-48A9-9186-39DB3A796354}" v="122" dt="2024-02-08T06:53:24.763"/>
+    <p1510:client id="{12583CBE-9CCD-48A9-9186-39DB3A796354}" v="123" dt="2024-02-20T03:17:44.316"/>
   </p1510:revLst>
 </p1510:revInfo>
 </file>
@@ -347,7 +347,7 @@
   <pc:docChgLst>
     <pc:chgData name="Jessica Ricks" userId="0490f4fba56e256d" providerId="LiveId" clId="{12583CBE-9CCD-48A9-9186-39DB3A796354}"/>
     <pc:docChg chg="undo custSel modSld">
-      <pc:chgData name="Jessica Ricks" userId="0490f4fba56e256d" providerId="LiveId" clId="{12583CBE-9CCD-48A9-9186-39DB3A796354}" dt="2024-02-13T03:40:00.051" v="547" actId="1076"/>
+      <pc:chgData name="Jessica Ricks" userId="0490f4fba56e256d" providerId="LiveId" clId="{12583CBE-9CCD-48A9-9186-39DB3A796354}" dt="2024-02-20T03:18:18.070" v="549" actId="478"/>
       <pc:docMkLst>
         <pc:docMk/>
       </pc:docMkLst>
@@ -792,7 +792,7 @@
         </pc:sldMkLst>
       </pc:sldChg>
       <pc:sldChg chg="addSp delSp modSp mod setBg">
-        <pc:chgData name="Jessica Ricks" userId="0490f4fba56e256d" providerId="LiveId" clId="{12583CBE-9CCD-48A9-9186-39DB3A796354}" dt="2024-02-13T03:40:00.051" v="547" actId="1076"/>
+        <pc:chgData name="Jessica Ricks" userId="0490f4fba56e256d" providerId="LiveId" clId="{12583CBE-9CCD-48A9-9186-39DB3A796354}" dt="2024-02-20T03:18:18.070" v="549" actId="478"/>
         <pc:sldMkLst>
           <pc:docMk/>
           <pc:sldMk cId="513399631" sldId="279"/>
@@ -837,6 +837,38 @@
             <ac:spMk id="7" creationId="{D5C5C24B-0EBB-587F-E5E8-866BAB3C4F6C}"/>
           </ac:spMkLst>
         </pc:spChg>
+        <pc:spChg chg="mod">
+          <ac:chgData name="Jessica Ricks" userId="0490f4fba56e256d" providerId="LiveId" clId="{12583CBE-9CCD-48A9-9186-39DB3A796354}" dt="2024-02-20T03:17:44.316" v="548" actId="571"/>
+          <ac:spMkLst>
+            <pc:docMk/>
+            <pc:sldMk cId="513399631" sldId="279"/>
+            <ac:spMk id="9" creationId="{A8F72BE6-0683-D86A-7FC0-7565D7B9F6A6}"/>
+          </ac:spMkLst>
+        </pc:spChg>
+        <pc:spChg chg="mod">
+          <ac:chgData name="Jessica Ricks" userId="0490f4fba56e256d" providerId="LiveId" clId="{12583CBE-9CCD-48A9-9186-39DB3A796354}" dt="2024-02-20T03:17:44.316" v="548" actId="571"/>
+          <ac:spMkLst>
+            <pc:docMk/>
+            <pc:sldMk cId="513399631" sldId="279"/>
+            <ac:spMk id="10" creationId="{50BA45E9-7FCB-CC2C-C440-AEDF0FA365C5}"/>
+          </ac:spMkLst>
+        </pc:spChg>
+        <pc:spChg chg="mod">
+          <ac:chgData name="Jessica Ricks" userId="0490f4fba56e256d" providerId="LiveId" clId="{12583CBE-9CCD-48A9-9186-39DB3A796354}" dt="2024-02-20T03:17:44.316" v="548" actId="571"/>
+          <ac:spMkLst>
+            <pc:docMk/>
+            <pc:sldMk cId="513399631" sldId="279"/>
+            <ac:spMk id="11" creationId="{1835969E-1E11-AD6F-16A4-C8FB751C9546}"/>
+          </ac:spMkLst>
+        </pc:spChg>
+        <pc:grpChg chg="add del mod">
+          <ac:chgData name="Jessica Ricks" userId="0490f4fba56e256d" providerId="LiveId" clId="{12583CBE-9CCD-48A9-9186-39DB3A796354}" dt="2024-02-20T03:18:18.070" v="549" actId="478"/>
+          <ac:grpSpMkLst>
+            <pc:docMk/>
+            <pc:sldMk cId="513399631" sldId="279"/>
+            <ac:grpSpMk id="3" creationId="{DFAD5480-BA4D-2259-B8F5-3BC85C012D1C}"/>
+          </ac:grpSpMkLst>
+        </pc:grpChg>
         <pc:grpChg chg="add mod">
           <ac:chgData name="Jessica Ricks" userId="0490f4fba56e256d" providerId="LiveId" clId="{12583CBE-9CCD-48A9-9186-39DB3A796354}" dt="2024-02-13T03:40:00.051" v="547" actId="1076"/>
           <ac:grpSpMkLst>
@@ -7977,7 +8009,7 @@
           <a:p>
             <a:fld id="{8FEC2210-9658-48ED-8A35-B6F75BA7F1DE}" type="datetimeFigureOut">
               <a:rPr lang="en-US" smtClean="0"/>
-              <a:t>2/12/2024</a:t>
+              <a:t>2/19/2024</a:t>
             </a:fld>
             <a:endParaRPr lang="en-US"/>
           </a:p>
@@ -10519,7 +10551,7 @@
           <a:p>
             <a:fld id="{A2105B53-A7C4-4AEA-8593-902643ECDC3B}" type="datetimeFigureOut">
               <a:rPr lang="en-US" smtClean="0"/>
-              <a:t>2/12/2024</a:t>
+              <a:t>2/19/2024</a:t>
             </a:fld>
             <a:endParaRPr lang="en-US"/>
           </a:p>
@@ -10717,7 +10749,7 @@
           <a:p>
             <a:fld id="{A2105B53-A7C4-4AEA-8593-902643ECDC3B}" type="datetimeFigureOut">
               <a:rPr lang="en-US" smtClean="0"/>
-              <a:t>2/12/2024</a:t>
+              <a:t>2/19/2024</a:t>
             </a:fld>
             <a:endParaRPr lang="en-US"/>
           </a:p>
@@ -10925,7 +10957,7 @@
           <a:p>
             <a:fld id="{A2105B53-A7C4-4AEA-8593-902643ECDC3B}" type="datetimeFigureOut">
               <a:rPr lang="en-US" smtClean="0"/>
-              <a:t>2/12/2024</a:t>
+              <a:t>2/19/2024</a:t>
             </a:fld>
             <a:endParaRPr lang="en-US"/>
           </a:p>
@@ -11123,7 +11155,7 @@
           <a:p>
             <a:fld id="{A2105B53-A7C4-4AEA-8593-902643ECDC3B}" type="datetimeFigureOut">
               <a:rPr lang="en-US" smtClean="0"/>
-              <a:t>2/12/2024</a:t>
+              <a:t>2/19/2024</a:t>
             </a:fld>
             <a:endParaRPr lang="en-US"/>
           </a:p>
@@ -11398,7 +11430,7 @@
           <a:p>
             <a:fld id="{A2105B53-A7C4-4AEA-8593-902643ECDC3B}" type="datetimeFigureOut">
               <a:rPr lang="en-US" smtClean="0"/>
-              <a:t>2/12/2024</a:t>
+              <a:t>2/19/2024</a:t>
             </a:fld>
             <a:endParaRPr lang="en-US"/>
           </a:p>
@@ -11663,7 +11695,7 @@
           <a:p>
             <a:fld id="{A2105B53-A7C4-4AEA-8593-902643ECDC3B}" type="datetimeFigureOut">
               <a:rPr lang="en-US" smtClean="0"/>
-              <a:t>2/12/2024</a:t>
+              <a:t>2/19/2024</a:t>
             </a:fld>
             <a:endParaRPr lang="en-US"/>
           </a:p>
@@ -12075,7 +12107,7 @@
           <a:p>
             <a:fld id="{A2105B53-A7C4-4AEA-8593-902643ECDC3B}" type="datetimeFigureOut">
               <a:rPr lang="en-US" smtClean="0"/>
-              <a:t>2/12/2024</a:t>
+              <a:t>2/19/2024</a:t>
             </a:fld>
             <a:endParaRPr lang="en-US"/>
           </a:p>
@@ -12216,7 +12248,7 @@
           <a:p>
             <a:fld id="{A2105B53-A7C4-4AEA-8593-902643ECDC3B}" type="datetimeFigureOut">
               <a:rPr lang="en-US" smtClean="0"/>
-              <a:t>2/12/2024</a:t>
+              <a:t>2/19/2024</a:t>
             </a:fld>
             <a:endParaRPr lang="en-US"/>
           </a:p>
@@ -12329,7 +12361,7 @@
           <a:p>
             <a:fld id="{A2105B53-A7C4-4AEA-8593-902643ECDC3B}" type="datetimeFigureOut">
               <a:rPr lang="en-US" smtClean="0"/>
-              <a:t>2/12/2024</a:t>
+              <a:t>2/19/2024</a:t>
             </a:fld>
             <a:endParaRPr lang="en-US"/>
           </a:p>
@@ -12640,7 +12672,7 @@
           <a:p>
             <a:fld id="{A2105B53-A7C4-4AEA-8593-902643ECDC3B}" type="datetimeFigureOut">
               <a:rPr lang="en-US" smtClean="0"/>
-              <a:t>2/12/2024</a:t>
+              <a:t>2/19/2024</a:t>
             </a:fld>
             <a:endParaRPr lang="en-US"/>
           </a:p>
@@ -12928,7 +12960,7 @@
           <a:p>
             <a:fld id="{A2105B53-A7C4-4AEA-8593-902643ECDC3B}" type="datetimeFigureOut">
               <a:rPr lang="en-US" smtClean="0"/>
-              <a:t>2/12/2024</a:t>
+              <a:t>2/19/2024</a:t>
             </a:fld>
             <a:endParaRPr lang="en-US"/>
           </a:p>
@@ -13169,7 +13201,7 @@
           <a:p>
             <a:fld id="{A2105B53-A7C4-4AEA-8593-902643ECDC3B}" type="datetimeFigureOut">
               <a:rPr lang="en-US" smtClean="0"/>
-              <a:t>2/12/2024</a:t>
+              <a:t>2/19/2024</a:t>
             </a:fld>
             <a:endParaRPr lang="en-US"/>
           </a:p>

</xml_diff>